<commit_message>
almost done with the build guide
</commit_message>
<xml_diff>
--- a/doc/res/solder_pics.pptx
+++ b/doc/res/solder_pics.pptx
@@ -291,7 +291,7 @@
           <a:p>
             <a:fld id="{E90ED720-0104-4369-84BC-D37694168613}" type="datetimeFigureOut">
               <a:rPr kumimoji="1" lang="ja-JP" altLang="en-US" smtClean="0"/>
-              <a:t>2021/2/21</a:t>
+              <a:t>2021/2/28</a:t>
             </a:fld>
             <a:endParaRPr kumimoji="1" lang="ja-JP" altLang="en-US"/>
           </a:p>
@@ -488,7 +488,7 @@
           <a:p>
             <a:fld id="{E90ED720-0104-4369-84BC-D37694168613}" type="datetimeFigureOut">
               <a:rPr kumimoji="1" lang="ja-JP" altLang="en-US" smtClean="0"/>
-              <a:t>2021/2/21</a:t>
+              <a:t>2021/2/28</a:t>
             </a:fld>
             <a:endParaRPr kumimoji="1" lang="ja-JP" altLang="en-US"/>
           </a:p>
@@ -695,7 +695,7 @@
           <a:p>
             <a:fld id="{E90ED720-0104-4369-84BC-D37694168613}" type="datetimeFigureOut">
               <a:rPr kumimoji="1" lang="ja-JP" altLang="en-US" smtClean="0"/>
-              <a:t>2021/2/21</a:t>
+              <a:t>2021/2/28</a:t>
             </a:fld>
             <a:endParaRPr kumimoji="1" lang="ja-JP" altLang="en-US"/>
           </a:p>
@@ -892,7 +892,7 @@
           <a:p>
             <a:fld id="{E90ED720-0104-4369-84BC-D37694168613}" type="datetimeFigureOut">
               <a:rPr kumimoji="1" lang="ja-JP" altLang="en-US" smtClean="0"/>
-              <a:t>2021/2/21</a:t>
+              <a:t>2021/2/28</a:t>
             </a:fld>
             <a:endParaRPr kumimoji="1" lang="ja-JP" altLang="en-US"/>
           </a:p>
@@ -1133,7 +1133,7 @@
           <a:p>
             <a:fld id="{E90ED720-0104-4369-84BC-D37694168613}" type="datetimeFigureOut">
               <a:rPr kumimoji="1" lang="ja-JP" altLang="en-US" smtClean="0"/>
-              <a:t>2021/2/21</a:t>
+              <a:t>2021/2/28</a:t>
             </a:fld>
             <a:endParaRPr kumimoji="1" lang="ja-JP" altLang="en-US"/>
           </a:p>
@@ -1480,7 +1480,7 @@
           <a:p>
             <a:fld id="{E90ED720-0104-4369-84BC-D37694168613}" type="datetimeFigureOut">
               <a:rPr kumimoji="1" lang="ja-JP" altLang="en-US" smtClean="0"/>
-              <a:t>2021/2/21</a:t>
+              <a:t>2021/2/28</a:t>
             </a:fld>
             <a:endParaRPr kumimoji="1" lang="ja-JP" altLang="en-US"/>
           </a:p>
@@ -1961,7 +1961,7 @@
           <a:p>
             <a:fld id="{E90ED720-0104-4369-84BC-D37694168613}" type="datetimeFigureOut">
               <a:rPr kumimoji="1" lang="ja-JP" altLang="en-US" smtClean="0"/>
-              <a:t>2021/2/21</a:t>
+              <a:t>2021/2/28</a:t>
             </a:fld>
             <a:endParaRPr kumimoji="1" lang="ja-JP" altLang="en-US"/>
           </a:p>
@@ -2074,7 +2074,7 @@
           <a:p>
             <a:fld id="{E90ED720-0104-4369-84BC-D37694168613}" type="datetimeFigureOut">
               <a:rPr kumimoji="1" lang="ja-JP" altLang="en-US" smtClean="0"/>
-              <a:t>2021/2/21</a:t>
+              <a:t>2021/2/28</a:t>
             </a:fld>
             <a:endParaRPr kumimoji="1" lang="ja-JP" altLang="en-US"/>
           </a:p>
@@ -2164,7 +2164,7 @@
           <a:p>
             <a:fld id="{E90ED720-0104-4369-84BC-D37694168613}" type="datetimeFigureOut">
               <a:rPr kumimoji="1" lang="ja-JP" altLang="en-US" smtClean="0"/>
-              <a:t>2021/2/21</a:t>
+              <a:t>2021/2/28</a:t>
             </a:fld>
             <a:endParaRPr kumimoji="1" lang="ja-JP" altLang="en-US"/>
           </a:p>
@@ -2468,7 +2468,7 @@
           <a:p>
             <a:fld id="{E90ED720-0104-4369-84BC-D37694168613}" type="datetimeFigureOut">
               <a:rPr kumimoji="1" lang="ja-JP" altLang="en-US" smtClean="0"/>
-              <a:t>2021/2/21</a:t>
+              <a:t>2021/2/28</a:t>
             </a:fld>
             <a:endParaRPr kumimoji="1" lang="ja-JP" altLang="en-US"/>
           </a:p>
@@ -2716,7 +2716,7 @@
           <a:p>
             <a:fld id="{E90ED720-0104-4369-84BC-D37694168613}" type="datetimeFigureOut">
               <a:rPr kumimoji="1" lang="ja-JP" altLang="en-US" smtClean="0"/>
-              <a:t>2021/2/21</a:t>
+              <a:t>2021/2/28</a:t>
             </a:fld>
             <a:endParaRPr kumimoji="1" lang="ja-JP" altLang="en-US"/>
           </a:p>
@@ -2956,7 +2956,7 @@
           <a:p>
             <a:fld id="{E90ED720-0104-4369-84BC-D37694168613}" type="datetimeFigureOut">
               <a:rPr kumimoji="1" lang="ja-JP" altLang="en-US" smtClean="0"/>
-              <a:t>2021/2/21</a:t>
+              <a:t>2021/2/28</a:t>
             </a:fld>
             <a:endParaRPr kumimoji="1" lang="ja-JP" altLang="en-US"/>
           </a:p>

</xml_diff>

<commit_message>
Added firmware information (#18)
</commit_message>
<xml_diff>
--- a/doc/res/solder_pics.pptx
+++ b/doc/res/solder_pics.pptx
@@ -9,6 +9,7 @@
     <p:sldId id="257" r:id="rId3"/>
     <p:sldId id="258" r:id="rId4"/>
     <p:sldId id="259" r:id="rId5"/>
+    <p:sldId id="260" r:id="rId6"/>
   </p:sldIdLst>
   <p:sldSz cx="9144000" cy="6858000" type="screen4x3"/>
   <p:notesSz cx="6858000" cy="9144000"/>
@@ -4537,6 +4538,182 @@
 </p:sld>
 </file>
 
+<file path=ppt/slides/slide5.xml><?xml version="1.0" encoding="utf-8"?>
+<p:sld xmlns:a="http://schemas.openxmlformats.org/drawingml/2006/main" xmlns:r="http://schemas.openxmlformats.org/officeDocument/2006/relationships" xmlns:p="http://schemas.openxmlformats.org/presentationml/2006/main">
+  <p:cSld>
+    <p:spTree>
+      <p:nvGrpSpPr>
+        <p:cNvPr id="1" name=""/>
+        <p:cNvGrpSpPr/>
+        <p:nvPr/>
+      </p:nvGrpSpPr>
+      <p:grpSpPr>
+        <a:xfrm>
+          <a:off x="0" y="0"/>
+          <a:ext cx="0" cy="0"/>
+          <a:chOff x="0" y="0"/>
+          <a:chExt cx="0" cy="0"/>
+        </a:xfrm>
+      </p:grpSpPr>
+      <p:pic>
+        <p:nvPicPr>
+          <p:cNvPr id="1027" name="Picture 3"/>
+          <p:cNvPicPr>
+            <a:picLocks noChangeAspect="1" noChangeArrowheads="1"/>
+          </p:cNvPicPr>
+          <p:nvPr/>
+        </p:nvPicPr>
+        <p:blipFill>
+          <a:blip r:embed="rId2">
+            <a:extLst>
+              <a:ext uri="{28A0092B-C50C-407E-A947-70E740481C1C}">
+                <a14:useLocalDpi xmlns:a14="http://schemas.microsoft.com/office/drawing/2010/main" val="0"/>
+              </a:ext>
+            </a:extLst>
+          </a:blip>
+          <a:srcRect/>
+          <a:stretch>
+            <a:fillRect/>
+          </a:stretch>
+        </p:blipFill>
+        <p:spPr bwMode="auto">
+          <a:xfrm>
+            <a:off x="467544" y="188640"/>
+            <a:ext cx="7600950" cy="6115050"/>
+          </a:xfrm>
+          <a:prstGeom prst="rect">
+            <a:avLst/>
+          </a:prstGeom>
+          <a:noFill/>
+          <a:ln>
+            <a:noFill/>
+          </a:ln>
+          <a:extLst>
+            <a:ext uri="{909E8E84-426E-40DD-AFC4-6F175D3DCCD1}">
+              <a14:hiddenFill xmlns:a14="http://schemas.microsoft.com/office/drawing/2010/main">
+                <a:solidFill>
+                  <a:schemeClr val="accent1"/>
+                </a:solidFill>
+              </a14:hiddenFill>
+            </a:ext>
+            <a:ext uri="{91240B29-F687-4F45-9708-019B960494DF}">
+              <a14:hiddenLine xmlns:a14="http://schemas.microsoft.com/office/drawing/2010/main" w="9525">
+                <a:solidFill>
+                  <a:schemeClr val="tx1"/>
+                </a:solidFill>
+                <a:miter lim="800000"/>
+                <a:headEnd/>
+                <a:tailEnd/>
+              </a14:hiddenLine>
+            </a:ext>
+          </a:extLst>
+        </p:spPr>
+      </p:pic>
+      <p:sp>
+        <p:nvSpPr>
+          <p:cNvPr id="2" name="正方形/長方形 1"/>
+          <p:cNvSpPr/>
+          <p:nvPr/>
+        </p:nvSpPr>
+        <p:spPr>
+          <a:xfrm>
+            <a:off x="5724128" y="692696"/>
+            <a:ext cx="2088232" cy="288032"/>
+          </a:xfrm>
+          <a:prstGeom prst="rect">
+            <a:avLst/>
+          </a:prstGeom>
+          <a:noFill/>
+          <a:ln>
+            <a:solidFill>
+              <a:srgbClr val="FF0000"/>
+            </a:solidFill>
+          </a:ln>
+        </p:spPr>
+        <p:style>
+          <a:lnRef idx="2">
+            <a:schemeClr val="accent1">
+              <a:shade val="50000"/>
+            </a:schemeClr>
+          </a:lnRef>
+          <a:fillRef idx="1">
+            <a:schemeClr val="accent1"/>
+          </a:fillRef>
+          <a:effectRef idx="0">
+            <a:schemeClr val="accent1"/>
+          </a:effectRef>
+          <a:fontRef idx="minor">
+            <a:schemeClr val="lt1"/>
+          </a:fontRef>
+        </p:style>
+        <p:txBody>
+          <a:bodyPr rtlCol="0" anchor="ctr"/>
+          <a:lstStyle/>
+          <a:p>
+            <a:pPr algn="ctr"/>
+            <a:endParaRPr kumimoji="1" lang="ja-JP" altLang="en-US"/>
+          </a:p>
+        </p:txBody>
+      </p:sp>
+      <p:sp>
+        <p:nvSpPr>
+          <p:cNvPr id="5" name="正方形/長方形 4"/>
+          <p:cNvSpPr/>
+          <p:nvPr/>
+        </p:nvSpPr>
+        <p:spPr>
+          <a:xfrm>
+            <a:off x="7092280" y="1196752"/>
+            <a:ext cx="864096" cy="216024"/>
+          </a:xfrm>
+          <a:prstGeom prst="rect">
+            <a:avLst/>
+          </a:prstGeom>
+          <a:noFill/>
+          <a:ln>
+            <a:solidFill>
+              <a:srgbClr val="FF0000"/>
+            </a:solidFill>
+          </a:ln>
+        </p:spPr>
+        <p:style>
+          <a:lnRef idx="2">
+            <a:schemeClr val="accent1">
+              <a:shade val="50000"/>
+            </a:schemeClr>
+          </a:lnRef>
+          <a:fillRef idx="1">
+            <a:schemeClr val="accent1"/>
+          </a:fillRef>
+          <a:effectRef idx="0">
+            <a:schemeClr val="accent1"/>
+          </a:effectRef>
+          <a:fontRef idx="minor">
+            <a:schemeClr val="lt1"/>
+          </a:fontRef>
+        </p:style>
+        <p:txBody>
+          <a:bodyPr rtlCol="0" anchor="ctr"/>
+          <a:lstStyle/>
+          <a:p>
+            <a:pPr algn="ctr"/>
+            <a:endParaRPr kumimoji="1" lang="ja-JP" altLang="en-US"/>
+          </a:p>
+        </p:txBody>
+      </p:sp>
+    </p:spTree>
+    <p:extLst>
+      <p:ext uri="{BB962C8B-B14F-4D97-AF65-F5344CB8AC3E}">
+        <p14:creationId xmlns:p14="http://schemas.microsoft.com/office/powerpoint/2010/main" val="1165927972"/>
+      </p:ext>
+    </p:extLst>
+  </p:cSld>
+  <p:clrMapOvr>
+    <a:masterClrMapping/>
+  </p:clrMapOvr>
+</p:sld>
+</file>
+
 <file path=ppt/theme/theme1.xml><?xml version="1.0" encoding="utf-8"?>
 <a:theme xmlns:a="http://schemas.openxmlformats.org/drawingml/2006/main" name="Office テーマ">
   <a:themeElements>

</xml_diff>